<commit_message>
Found the right directory, deleted the new one that was redundant
</commit_message>
<xml_diff>
--- a/docs/Slides/1-Intro-2-FirstApp.pptx
+++ b/docs/Slides/1-Intro-2-FirstApp.pptx
@@ -229,7 +229,7 @@
           <a:p>
             <a:fld id="{1FC32AA1-1225-9048-80C3-2B6F58548154}" type="datetimeFigureOut">
               <a:rPr lang="en-US" smtClean="0"/>
-              <a:t>6/25/19</a:t>
+              <a:t>9/30/19</a:t>
             </a:fld>
             <a:endParaRPr lang="en-US"/>
           </a:p>
@@ -1968,7 +1968,7 @@
           <a:p>
             <a:fld id="{12110144-19AD-4D4E-902D-E18AF93089D3}" type="datetimeFigureOut">
               <a:rPr lang="en-US" smtClean="0"/>
-              <a:t>6/25/19</a:t>
+              <a:t>9/30/19</a:t>
             </a:fld>
             <a:endParaRPr lang="en-US"/>
           </a:p>
@@ -2136,7 +2136,7 @@
           <a:p>
             <a:fld id="{12110144-19AD-4D4E-902D-E18AF93089D3}" type="datetimeFigureOut">
               <a:rPr lang="en-US" smtClean="0"/>
-              <a:t>6/25/19</a:t>
+              <a:t>9/30/19</a:t>
             </a:fld>
             <a:endParaRPr lang="en-US"/>
           </a:p>
@@ -2314,7 +2314,7 @@
           <a:p>
             <a:fld id="{12110144-19AD-4D4E-902D-E18AF93089D3}" type="datetimeFigureOut">
               <a:rPr lang="en-US" smtClean="0"/>
-              <a:t>6/25/19</a:t>
+              <a:t>9/30/19</a:t>
             </a:fld>
             <a:endParaRPr lang="en-US"/>
           </a:p>
@@ -2482,7 +2482,7 @@
           <a:p>
             <a:fld id="{12110144-19AD-4D4E-902D-E18AF93089D3}" type="datetimeFigureOut">
               <a:rPr lang="en-US" smtClean="0"/>
-              <a:t>6/25/19</a:t>
+              <a:t>9/30/19</a:t>
             </a:fld>
             <a:endParaRPr lang="en-US"/>
           </a:p>
@@ -2727,7 +2727,7 @@
           <a:p>
             <a:fld id="{12110144-19AD-4D4E-902D-E18AF93089D3}" type="datetimeFigureOut">
               <a:rPr lang="en-US" smtClean="0"/>
-              <a:t>6/25/19</a:t>
+              <a:t>9/30/19</a:t>
             </a:fld>
             <a:endParaRPr lang="en-US"/>
           </a:p>
@@ -3012,7 +3012,7 @@
           <a:p>
             <a:fld id="{12110144-19AD-4D4E-902D-E18AF93089D3}" type="datetimeFigureOut">
               <a:rPr lang="en-US" smtClean="0"/>
-              <a:t>6/25/19</a:t>
+              <a:t>9/30/19</a:t>
             </a:fld>
             <a:endParaRPr lang="en-US"/>
           </a:p>
@@ -3431,7 +3431,7 @@
           <a:p>
             <a:fld id="{12110144-19AD-4D4E-902D-E18AF93089D3}" type="datetimeFigureOut">
               <a:rPr lang="en-US" smtClean="0"/>
-              <a:t>6/25/19</a:t>
+              <a:t>9/30/19</a:t>
             </a:fld>
             <a:endParaRPr lang="en-US"/>
           </a:p>
@@ -3548,7 +3548,7 @@
           <a:p>
             <a:fld id="{12110144-19AD-4D4E-902D-E18AF93089D3}" type="datetimeFigureOut">
               <a:rPr lang="en-US" smtClean="0"/>
-              <a:t>6/25/19</a:t>
+              <a:t>9/30/19</a:t>
             </a:fld>
             <a:endParaRPr lang="en-US"/>
           </a:p>
@@ -3643,7 +3643,7 @@
           <a:p>
             <a:fld id="{12110144-19AD-4D4E-902D-E18AF93089D3}" type="datetimeFigureOut">
               <a:rPr lang="en-US" smtClean="0"/>
-              <a:t>6/25/19</a:t>
+              <a:t>9/30/19</a:t>
             </a:fld>
             <a:endParaRPr lang="en-US"/>
           </a:p>
@@ -3918,7 +3918,7 @@
           <a:p>
             <a:fld id="{12110144-19AD-4D4E-902D-E18AF93089D3}" type="datetimeFigureOut">
               <a:rPr lang="en-US" smtClean="0"/>
-              <a:t>6/25/19</a:t>
+              <a:t>9/30/19</a:t>
             </a:fld>
             <a:endParaRPr lang="en-US"/>
           </a:p>
@@ -4170,7 +4170,7 @@
           <a:p>
             <a:fld id="{12110144-19AD-4D4E-902D-E18AF93089D3}" type="datetimeFigureOut">
               <a:rPr lang="en-US" smtClean="0"/>
-              <a:t>6/25/19</a:t>
+              <a:t>9/30/19</a:t>
             </a:fld>
             <a:endParaRPr lang="en-US"/>
           </a:p>
@@ -4381,7 +4381,7 @@
           <a:p>
             <a:fld id="{12110144-19AD-4D4E-902D-E18AF93089D3}" type="datetimeFigureOut">
               <a:rPr lang="en-US" smtClean="0"/>
-              <a:t>6/25/19</a:t>
+              <a:t>9/30/19</a:t>
             </a:fld>
             <a:endParaRPr lang="en-US"/>
           </a:p>
@@ -4812,7 +4812,13 @@
       </p:sp>
       <p:sp>
         <p:nvSpPr>
-          <p:cNvPr id="3" name="Subtitle 2"/>
+          <p:cNvPr id="5" name="Subtitle 4">
+            <a:extLst>
+              <a:ext uri="{FF2B5EF4-FFF2-40B4-BE49-F238E27FC236}">
+                <a16:creationId xmlns:a16="http://schemas.microsoft.com/office/drawing/2014/main" id="{371E1D4E-88B9-E548-AC09-CD01BED77C37}"/>
+              </a:ext>
+            </a:extLst>
+          </p:cNvPr>
           <p:cNvSpPr>
             <a:spLocks noGrp="1"/>
           </p:cNvSpPr>
@@ -4820,26 +4826,12 @@
             <p:ph type="subTitle" idx="1"/>
           </p:nvPr>
         </p:nvSpPr>
-        <p:spPr>
-          <a:xfrm>
-            <a:off x="5960619" y="4534382"/>
-            <a:ext cx="2391112" cy="957740"/>
-          </a:xfrm>
-        </p:spPr>
-        <p:txBody>
-          <a:bodyPr>
-            <a:noAutofit/>
-          </a:bodyPr>
+        <p:spPr/>
+        <p:txBody>
+          <a:bodyPr/>
           <a:lstStyle/>
           <a:p>
-            <a:r>
-              <a:rPr lang="en-US" sz="4400" b="1" dirty="0">
-                <a:solidFill>
-                  <a:schemeClr val="tx1"/>
-                </a:solidFill>
-              </a:rPr>
-              <a:t>CIS 399</a:t>
-            </a:r>
+            <a:endParaRPr lang="en-US"/>
           </a:p>
         </p:txBody>
       </p:sp>
@@ -7127,7 +7119,7 @@
           </a:effectLst>
           <a:extLst>
             <a:ext uri="{909E8E84-426E-40dd-AFC4-6F175D3DCCD1}">
-              <a14:hiddenFill xmlns="" xmlns:a14="http://schemas.microsoft.com/office/drawing/2010/main">
+              <a14:hiddenFill xmlns:a14="http://schemas.microsoft.com/office/drawing/2010/main" xmlns="">
                 <a:solidFill>
                   <a:srgbClr val="FFFFFF"/>
                 </a:solidFill>
@@ -7164,7 +7156,7 @@
           </a:ln>
           <a:extLst>
             <a:ext uri="{909E8E84-426E-40dd-AFC4-6F175D3DCCD1}">
-              <a14:hiddenFill xmlns="" xmlns:a14="http://schemas.microsoft.com/office/drawing/2010/main">
+              <a14:hiddenFill xmlns:a14="http://schemas.microsoft.com/office/drawing/2010/main" xmlns="">
                 <a:noFill/>
               </a14:hiddenFill>
             </a:ext>
@@ -7195,7 +7187,7 @@
           </a:ln>
           <a:extLst>
             <a:ext uri="{91240B29-F687-4f45-9708-019B960494DF}">
-              <a14:hiddenLine xmlns="" xmlns:a14="http://schemas.microsoft.com/office/drawing/2010/main" w="9525">
+              <a14:hiddenLine xmlns:a14="http://schemas.microsoft.com/office/drawing/2010/main" xmlns="" w="9525">
                 <a:solidFill>
                   <a:srgbClr val="000000"/>
                 </a:solidFill>
@@ -7283,7 +7275,7 @@
           </a:ln>
           <a:extLst>
             <a:ext uri="{91240B29-F687-4f45-9708-019B960494DF}">
-              <a14:hiddenLine xmlns="" xmlns:a14="http://schemas.microsoft.com/office/drawing/2010/main" w="9525">
+              <a14:hiddenLine xmlns:a14="http://schemas.microsoft.com/office/drawing/2010/main" xmlns="" w="9525">
                 <a:solidFill>
                   <a:srgbClr val="000000"/>
                 </a:solidFill>
@@ -7374,7 +7366,7 @@
           </a:ln>
           <a:extLst>
             <a:ext uri="{909E8E84-426E-40dd-AFC4-6F175D3DCCD1}">
-              <a14:hiddenFill xmlns="" xmlns:a14="http://schemas.microsoft.com/office/drawing/2010/main">
+              <a14:hiddenFill xmlns:a14="http://schemas.microsoft.com/office/drawing/2010/main" xmlns="">
                 <a:noFill/>
               </a14:hiddenFill>
             </a:ext>
@@ -7409,7 +7401,7 @@
           </a:ln>
           <a:extLst>
             <a:ext uri="{909E8E84-426E-40dd-AFC4-6F175D3DCCD1}">
-              <a14:hiddenFill xmlns="" xmlns:a14="http://schemas.microsoft.com/office/drawing/2010/main">
+              <a14:hiddenFill xmlns:a14="http://schemas.microsoft.com/office/drawing/2010/main" xmlns="">
                 <a:noFill/>
               </a14:hiddenFill>
             </a:ext>
@@ -7440,7 +7432,7 @@
           </a:ln>
           <a:extLst>
             <a:ext uri="{91240B29-F687-4f45-9708-019B960494DF}">
-              <a14:hiddenLine xmlns="" xmlns:a14="http://schemas.microsoft.com/office/drawing/2010/main" w="9525">
+              <a14:hiddenLine xmlns:a14="http://schemas.microsoft.com/office/drawing/2010/main" xmlns="" w="9525">
                 <a:solidFill>
                   <a:srgbClr val="000000"/>
                 </a:solidFill>
@@ -7683,7 +7675,7 @@
           <a:graphicData uri="http://schemas.openxmlformats.org/presentationml/2006/ole">
             <mc:AlternateContent xmlns:mc="http://schemas.openxmlformats.org/markup-compatibility/2006">
               <mc:Choice xmlns:v="urn:schemas-microsoft-com:vml" Requires="v">
-                <p:oleObj spid="_x0000_s1041" name="Document" r:id="rId3" imgW="7377498" imgH="5042723" progId="Word.Document.12">
+                <p:oleObj spid="_x0000_s1042" name="Document" r:id="rId3" imgW="7377498" imgH="5042723" progId="Word.Document.12">
                   <p:embed/>
                 </p:oleObj>
               </mc:Choice>
@@ -8461,7 +8453,7 @@
           <a:graphicData uri="http://schemas.openxmlformats.org/presentationml/2006/ole">
             <mc:AlternateContent xmlns:mc="http://schemas.openxmlformats.org/markup-compatibility/2006">
               <mc:Choice xmlns:v="urn:schemas-microsoft-com:vml" Requires="v">
-                <p:oleObj spid="_x0000_s2064" name="Document" r:id="rId3" imgW="7377498" imgH="1980363" progId="Word.Document.12">
+                <p:oleObj spid="_x0000_s2065" name="Document" r:id="rId3" imgW="7377498" imgH="1980363" progId="Word.Document.12">
                   <p:embed/>
                 </p:oleObj>
               </mc:Choice>
@@ -8699,7 +8691,7 @@
 </file>
 
 <file path=ppt/slides/slide2.xml><?xml version="1.0" encoding="utf-8"?>
-<p:sld xmlns:a="http://schemas.openxmlformats.org/drawingml/2006/main" xmlns:r="http://schemas.openxmlformats.org/officeDocument/2006/relationships" xmlns:p="http://schemas.openxmlformats.org/presentationml/2006/main">
+<p:sld xmlns:a="http://schemas.openxmlformats.org/drawingml/2006/main" xmlns:r="http://schemas.openxmlformats.org/officeDocument/2006/relationships" xmlns:p="http://schemas.openxmlformats.org/presentationml/2006/main" show="0">
   <p:cSld>
     <p:bg>
       <p:bgPr>

</xml_diff>